<commit_message>
Added the model score tracking in an output text file.
</commit_message>
<xml_diff>
--- a/matchability_api/matchability_lib/slides/Seed AI - AIESEC - June21.pptx
+++ b/matchability_api/matchability_lib/slides/Seed AI - AIESEC - June21.pptx
@@ -191,7 +191,7 @@
 <file path=ppt/revisionInfo.xml><?xml version="1.0" encoding="utf-8"?>
 <p1510:revInfo xmlns:a="http://schemas.openxmlformats.org/drawingml/2006/main" xmlns:r="http://schemas.openxmlformats.org/officeDocument/2006/relationships" xmlns:p1510="http://schemas.microsoft.com/office/powerpoint/2015/10/main">
   <p1510:revLst>
-    <p1510:client id="{A8F3EF81-C497-A949-B696-6E6BA043C220}" v="449" dt="2019-06-20T16:19:09.358"/>
+    <p1510:client id="{EF9290DF-5923-6D4A-83D2-CCCB584B481B}" v="2" dt="2019-08-16T18:12:54.018"/>
   </p1510:revLst>
 </p1510:revInfo>
 </file>
@@ -2960,11 +2960,20 @@
           </ac:cxnSpMkLst>
         </pc:cxnChg>
       </pc:sldChg>
+    </pc:docChg>
+  </pc:docChgLst>
+  <pc:docChgLst>
+    <pc:chgData name="Felix Simard" userId="0ff2320e-25dc-476a-99f1-d12bd5d46f7f" providerId="ADAL" clId="{EF9290DF-5923-6D4A-83D2-CCCB584B481B}"/>
+    <pc:docChg chg="addSld delSld modSld">
+      <pc:chgData name="Felix Simard" userId="0ff2320e-25dc-476a-99f1-d12bd5d46f7f" providerId="ADAL" clId="{EF9290DF-5923-6D4A-83D2-CCCB584B481B}" dt="2019-08-16T18:12:54.018" v="1"/>
+      <pc:docMkLst>
+        <pc:docMk/>
+      </pc:docMkLst>
       <pc:sldChg chg="add del">
-        <pc:chgData name="Felix Simard" userId="0ff2320e-25dc-476a-99f1-d12bd5d46f7f" providerId="ADAL" clId="{A8F3EF81-C497-A949-B696-6E6BA043C220}" dt="2019-06-20T15:31:48.534" v="11255"/>
+        <pc:chgData name="Felix Simard" userId="0ff2320e-25dc-476a-99f1-d12bd5d46f7f" providerId="ADAL" clId="{EF9290DF-5923-6D4A-83D2-CCCB584B481B}" dt="2019-08-16T18:12:54.018" v="1"/>
         <pc:sldMkLst>
           <pc:docMk/>
-          <pc:sldMk cId="2183353344" sldId="974"/>
+          <pc:sldMk cId="727116927" sldId="256"/>
         </pc:sldMkLst>
       </pc:sldChg>
     </pc:docChg>
@@ -3810,7 +3819,7 @@
           <a:p>
             <a:fld id="{8277B447-5DDE-462B-8A0D-CEF49CFE499A}" type="datetimeFigureOut">
               <a:rPr lang="fr-CA" smtClean="0"/>
-              <a:t>19-06-21</a:t>
+              <a:t>19-08-16</a:t>
             </a:fld>
             <a:endParaRPr lang="fr-CA"/>
           </a:p>
@@ -6120,7 +6129,7 @@
                 <a:tabLst/>
                 <a:defRPr/>
               </a:pPr>
-              <a:t>19-06-21</a:t>
+              <a:t>19-08-16</a:t>
             </a:fld>
             <a:endParaRPr kumimoji="0" lang="en-US" sz="1100" b="0" i="0" u="none" strike="noStrike" kern="1200" cap="none" spc="0" normalizeH="0" baseline="0" noProof="0" dirty="0">
               <a:ln>
@@ -6700,7 +6709,7 @@
                 <a:tabLst/>
                 <a:defRPr/>
               </a:pPr>
-              <a:t>19-06-21</a:t>
+              <a:t>19-08-16</a:t>
             </a:fld>
             <a:endParaRPr kumimoji="0" lang="en-US" sz="1100" b="0" i="0" u="none" strike="noStrike" kern="1200" cap="none" spc="0" normalizeH="0" baseline="0" noProof="0" dirty="0">
               <a:ln>
@@ -7152,7 +7161,7 @@
                 <a:tabLst/>
                 <a:defRPr/>
               </a:pPr>
-              <a:t>19-06-21</a:t>
+              <a:t>19-08-16</a:t>
             </a:fld>
             <a:endParaRPr kumimoji="0" lang="en-US" sz="1100" b="0" i="0" u="none" strike="noStrike" kern="1200" cap="none" spc="0" normalizeH="0" baseline="0" noProof="0" dirty="0">
               <a:ln>
@@ -7552,7 +7561,7 @@
                 <a:tabLst/>
                 <a:defRPr/>
               </a:pPr>
-              <a:t>19-06-21</a:t>
+              <a:t>19-08-16</a:t>
             </a:fld>
             <a:endParaRPr kumimoji="0" lang="en-US" sz="1100" b="0" i="0" u="none" strike="noStrike" kern="1200" cap="none" spc="0" normalizeH="0" baseline="0" noProof="0" dirty="0">
               <a:ln>
@@ -7957,7 +7966,7 @@
                 <a:tabLst/>
                 <a:defRPr/>
               </a:pPr>
-              <a:t>19-06-21</a:t>
+              <a:t>19-08-16</a:t>
             </a:fld>
             <a:endParaRPr kumimoji="0" lang="en-US" sz="1100" b="0" i="0" u="none" strike="noStrike" kern="1200" cap="none" spc="0" normalizeH="0" baseline="0" noProof="0" dirty="0">
               <a:ln>
@@ -8358,7 +8367,7 @@
                 <a:tabLst/>
                 <a:defRPr/>
               </a:pPr>
-              <a:t>19-06-21</a:t>
+              <a:t>19-08-16</a:t>
             </a:fld>
             <a:endParaRPr kumimoji="0" lang="en-US" sz="1100" b="0" i="0" u="none" strike="noStrike" kern="1200" cap="none" spc="0" normalizeH="0" baseline="0" noProof="0" dirty="0">
               <a:ln>
@@ -8800,7 +8809,7 @@
                 <a:tabLst/>
                 <a:defRPr/>
               </a:pPr>
-              <a:t>19-06-21</a:t>
+              <a:t>19-08-16</a:t>
             </a:fld>
             <a:endParaRPr kumimoji="0" lang="en-US" sz="1100" b="0" i="0" u="none" strike="noStrike" kern="1200" cap="none" spc="0" normalizeH="0" baseline="0" noProof="0" dirty="0">
               <a:ln>
@@ -9282,7 +9291,7 @@
                 <a:tabLst/>
                 <a:defRPr/>
               </a:pPr>
-              <a:t>19-06-21</a:t>
+              <a:t>19-08-16</a:t>
             </a:fld>
             <a:endParaRPr kumimoji="0" lang="en-US" sz="1100" b="0" i="0" u="none" strike="noStrike" kern="1200" cap="none" spc="0" normalizeH="0" baseline="0" noProof="0" dirty="0">
               <a:ln>
@@ -9749,7 +9758,7 @@
                 <a:tabLst/>
                 <a:defRPr/>
               </a:pPr>
-              <a:t>19-06-21</a:t>
+              <a:t>19-08-16</a:t>
             </a:fld>
             <a:endParaRPr kumimoji="0" lang="en-US" sz="1100" b="0" i="0" u="none" strike="noStrike" kern="1200" cap="none" spc="0" normalizeH="0" baseline="0" noProof="0" dirty="0">
               <a:ln>
@@ -10428,7 +10437,7 @@
                 <a:tabLst/>
                 <a:defRPr/>
               </a:pPr>
-              <a:t>19-06-21</a:t>
+              <a:t>19-08-16</a:t>
             </a:fld>
             <a:endParaRPr kumimoji="0" lang="en-US" sz="1100" b="0" i="0" u="none" strike="noStrike" kern="1200" cap="none" spc="0" normalizeH="0" baseline="0" noProof="0" dirty="0">
               <a:ln>
@@ -10725,7 +10734,7 @@
                 <a:tabLst/>
                 <a:defRPr/>
               </a:pPr>
-              <a:t>19-06-21</a:t>
+              <a:t>19-08-16</a:t>
             </a:fld>
             <a:endParaRPr kumimoji="0" lang="en-US" sz="1100" b="0" i="0" u="none" strike="noStrike" kern="1200" cap="none" spc="0" normalizeH="0" baseline="0" noProof="0" dirty="0">
               <a:ln>
@@ -11544,7 +11553,7 @@
                 <a:tabLst/>
                 <a:defRPr/>
               </a:pPr>
-              <a:t>19-06-21</a:t>
+              <a:t>19-08-16</a:t>
             </a:fld>
             <a:endParaRPr kumimoji="0" lang="en-US" sz="1100" b="0" i="0" u="none" strike="noStrike" kern="1200" cap="none" spc="0" normalizeH="0" baseline="0" noProof="0" dirty="0">
               <a:ln>
@@ -12015,7 +12024,7 @@
                 <a:tabLst/>
                 <a:defRPr/>
               </a:pPr>
-              <a:t>19-06-21</a:t>
+              <a:t>19-08-16</a:t>
             </a:fld>
             <a:endParaRPr kumimoji="0" lang="en-US" sz="1100" b="0" i="0" u="none" strike="noStrike" kern="1200" cap="none" spc="0" normalizeH="0" baseline="0" noProof="0" dirty="0">
               <a:ln>

</xml_diff>